<commit_message>
cleaning up repo and removing blue color from prompt module figure
</commit_message>
<xml_diff>
--- a/Prompt-Struktur.pptx
+++ b/Prompt-Struktur.pptx
@@ -105,19 +105,183 @@
       </a:defRPr>
     </a:lvl9pPr>
   </p:defaultTextStyle>
+  <p:extLst>
+    <p:ext uri="{EFAFB233-063F-42B5-8137-9DF3F51BA10A}">
+      <p15:sldGuideLst xmlns:p15="http://schemas.microsoft.com/office/powerpoint/2012/main"/>
+    </p:ext>
+  </p:extLst>
 </p:presentation>
-</file>
-
-<file path=ppt/revisionInfo.xml><?xml version="1.0" encoding="utf-8"?>
-<p1510:revInfo xmlns:a="http://schemas.openxmlformats.org/drawingml/2006/main" xmlns:r="http://schemas.openxmlformats.org/officeDocument/2006/relationships" xmlns:p1510="http://schemas.microsoft.com/office/powerpoint/2015/10/main">
-  <p1510:revLst>
-    <p1510:client id="{69F85E03-FBE9-4CCC-80F3-8F4E112D3773}" v="73" dt="2025-01-18T12:52:04.078"/>
-  </p1510:revLst>
-</p1510:revInfo>
 </file>
 
 <file path=ppt/changesInfos/changesInfo1.xml><?xml version="1.0" encoding="utf-8"?>
 <pc:chgInfo xmlns:a="http://schemas.openxmlformats.org/drawingml/2006/main" xmlns:r="http://schemas.openxmlformats.org/officeDocument/2006/relationships" xmlns:ac="http://schemas.microsoft.com/office/drawing/2013/main/command" xmlns:pc="http://schemas.microsoft.com/office/powerpoint/2013/main/command">
+  <pc:docChgLst>
+    <pc:chgData name="Ben Fels" userId="96c832df0262a68b" providerId="LiveId" clId="{0E148846-4EDD-49EE-8355-9DD57AFB4E3E}"/>
+    <pc:docChg chg="modSld">
+      <pc:chgData name="Ben Fels" userId="96c832df0262a68b" providerId="LiveId" clId="{0E148846-4EDD-49EE-8355-9DD57AFB4E3E}" dt="2025-02-07T08:16:11.273" v="1" actId="208"/>
+      <pc:docMkLst>
+        <pc:docMk/>
+      </pc:docMkLst>
+      <pc:sldChg chg="modSp mod">
+        <pc:chgData name="Ben Fels" userId="96c832df0262a68b" providerId="LiveId" clId="{0E148846-4EDD-49EE-8355-9DD57AFB4E3E}" dt="2025-02-07T08:16:11.273" v="1" actId="208"/>
+        <pc:sldMkLst>
+          <pc:docMk/>
+          <pc:sldMk cId="3472356501" sldId="270"/>
+        </pc:sldMkLst>
+        <pc:spChg chg="mod">
+          <ac:chgData name="Ben Fels" userId="96c832df0262a68b" providerId="LiveId" clId="{0E148846-4EDD-49EE-8355-9DD57AFB4E3E}" dt="2025-02-07T08:16:11.273" v="1" actId="208"/>
+          <ac:spMkLst>
+            <pc:docMk/>
+            <pc:sldMk cId="3472356501" sldId="270"/>
+            <ac:spMk id="4" creationId="{6D9DFD70-DD6A-4BEA-CFA0-4D41EE1F7C0D}"/>
+          </ac:spMkLst>
+        </pc:spChg>
+        <pc:spChg chg="mod">
+          <ac:chgData name="Ben Fels" userId="96c832df0262a68b" providerId="LiveId" clId="{0E148846-4EDD-49EE-8355-9DD57AFB4E3E}" dt="2025-02-07T08:16:11.273" v="1" actId="208"/>
+          <ac:spMkLst>
+            <pc:docMk/>
+            <pc:sldMk cId="3472356501" sldId="270"/>
+            <ac:spMk id="5" creationId="{927D3076-6788-5977-3395-CAE8474EB017}"/>
+          </ac:spMkLst>
+        </pc:spChg>
+        <pc:spChg chg="mod">
+          <ac:chgData name="Ben Fels" userId="96c832df0262a68b" providerId="LiveId" clId="{0E148846-4EDD-49EE-8355-9DD57AFB4E3E}" dt="2025-02-07T08:16:11.273" v="1" actId="208"/>
+          <ac:spMkLst>
+            <pc:docMk/>
+            <pc:sldMk cId="3472356501" sldId="270"/>
+            <ac:spMk id="8" creationId="{4416F961-7714-8290-5537-6E41E949A3F5}"/>
+          </ac:spMkLst>
+        </pc:spChg>
+        <pc:spChg chg="mod">
+          <ac:chgData name="Ben Fels" userId="96c832df0262a68b" providerId="LiveId" clId="{0E148846-4EDD-49EE-8355-9DD57AFB4E3E}" dt="2025-02-07T08:16:11.273" v="1" actId="208"/>
+          <ac:spMkLst>
+            <pc:docMk/>
+            <pc:sldMk cId="3472356501" sldId="270"/>
+            <ac:spMk id="9" creationId="{5EBC7210-36C6-E79B-4AAC-03FBC0526ED6}"/>
+          </ac:spMkLst>
+        </pc:spChg>
+        <pc:spChg chg="mod">
+          <ac:chgData name="Ben Fels" userId="96c832df0262a68b" providerId="LiveId" clId="{0E148846-4EDD-49EE-8355-9DD57AFB4E3E}" dt="2025-02-07T08:16:11.273" v="1" actId="208"/>
+          <ac:spMkLst>
+            <pc:docMk/>
+            <pc:sldMk cId="3472356501" sldId="270"/>
+            <ac:spMk id="10" creationId="{98E8552C-8FB8-D939-7C07-F3C862A66DA5}"/>
+          </ac:spMkLst>
+        </pc:spChg>
+        <pc:spChg chg="mod">
+          <ac:chgData name="Ben Fels" userId="96c832df0262a68b" providerId="LiveId" clId="{0E148846-4EDD-49EE-8355-9DD57AFB4E3E}" dt="2025-02-07T08:16:11.273" v="1" actId="208"/>
+          <ac:spMkLst>
+            <pc:docMk/>
+            <pc:sldMk cId="3472356501" sldId="270"/>
+            <ac:spMk id="13" creationId="{FC916043-C66D-6181-7DBC-443C6C689010}"/>
+          </ac:spMkLst>
+        </pc:spChg>
+        <pc:spChg chg="mod">
+          <ac:chgData name="Ben Fels" userId="96c832df0262a68b" providerId="LiveId" clId="{0E148846-4EDD-49EE-8355-9DD57AFB4E3E}" dt="2025-02-07T08:16:11.273" v="1" actId="208"/>
+          <ac:spMkLst>
+            <pc:docMk/>
+            <pc:sldMk cId="3472356501" sldId="270"/>
+            <ac:spMk id="14" creationId="{16365FF9-01F8-2535-9AB2-2D9F458C5CF4}"/>
+          </ac:spMkLst>
+        </pc:spChg>
+        <pc:spChg chg="mod">
+          <ac:chgData name="Ben Fels" userId="96c832df0262a68b" providerId="LiveId" clId="{0E148846-4EDD-49EE-8355-9DD57AFB4E3E}" dt="2025-02-07T08:16:11.273" v="1" actId="208"/>
+          <ac:spMkLst>
+            <pc:docMk/>
+            <pc:sldMk cId="3472356501" sldId="270"/>
+            <ac:spMk id="15" creationId="{F44E9535-F336-B295-43F1-BB31E5710556}"/>
+          </ac:spMkLst>
+        </pc:spChg>
+        <pc:spChg chg="mod">
+          <ac:chgData name="Ben Fels" userId="96c832df0262a68b" providerId="LiveId" clId="{0E148846-4EDD-49EE-8355-9DD57AFB4E3E}" dt="2025-02-07T08:16:11.273" v="1" actId="208"/>
+          <ac:spMkLst>
+            <pc:docMk/>
+            <pc:sldMk cId="3472356501" sldId="270"/>
+            <ac:spMk id="17" creationId="{D78EF589-FE3D-29B1-AA73-CEA975CE6033}"/>
+          </ac:spMkLst>
+        </pc:spChg>
+        <pc:spChg chg="mod">
+          <ac:chgData name="Ben Fels" userId="96c832df0262a68b" providerId="LiveId" clId="{0E148846-4EDD-49EE-8355-9DD57AFB4E3E}" dt="2025-02-07T08:16:11.273" v="1" actId="208"/>
+          <ac:spMkLst>
+            <pc:docMk/>
+            <pc:sldMk cId="3472356501" sldId="270"/>
+            <ac:spMk id="18" creationId="{75000FA0-591A-161C-417E-B83BEA6073A7}"/>
+          </ac:spMkLst>
+        </pc:spChg>
+      </pc:sldChg>
+      <pc:sldChg chg="modSp mod">
+        <pc:chgData name="Ben Fels" userId="96c832df0262a68b" providerId="LiveId" clId="{0E148846-4EDD-49EE-8355-9DD57AFB4E3E}" dt="2025-02-07T08:15:54.752" v="0" actId="208"/>
+        <pc:sldMkLst>
+          <pc:docMk/>
+          <pc:sldMk cId="4159736329" sldId="271"/>
+        </pc:sldMkLst>
+        <pc:spChg chg="mod">
+          <ac:chgData name="Ben Fels" userId="96c832df0262a68b" providerId="LiveId" clId="{0E148846-4EDD-49EE-8355-9DD57AFB4E3E}" dt="2025-02-07T08:15:54.752" v="0" actId="208"/>
+          <ac:spMkLst>
+            <pc:docMk/>
+            <pc:sldMk cId="4159736329" sldId="271"/>
+            <ac:spMk id="3" creationId="{B90CD23A-7198-FCD4-2CB7-60B16B32CBAF}"/>
+          </ac:spMkLst>
+        </pc:spChg>
+        <pc:spChg chg="mod">
+          <ac:chgData name="Ben Fels" userId="96c832df0262a68b" providerId="LiveId" clId="{0E148846-4EDD-49EE-8355-9DD57AFB4E3E}" dt="2025-02-07T08:15:54.752" v="0" actId="208"/>
+          <ac:spMkLst>
+            <pc:docMk/>
+            <pc:sldMk cId="4159736329" sldId="271"/>
+            <ac:spMk id="4" creationId="{E98A9F93-2ADE-112B-1200-525D7935A978}"/>
+          </ac:spMkLst>
+        </pc:spChg>
+        <pc:spChg chg="mod">
+          <ac:chgData name="Ben Fels" userId="96c832df0262a68b" providerId="LiveId" clId="{0E148846-4EDD-49EE-8355-9DD57AFB4E3E}" dt="2025-02-07T08:15:54.752" v="0" actId="208"/>
+          <ac:spMkLst>
+            <pc:docMk/>
+            <pc:sldMk cId="4159736329" sldId="271"/>
+            <ac:spMk id="5" creationId="{F70489B9-4E00-83FE-7484-B7DDDE7E9326}"/>
+          </ac:spMkLst>
+        </pc:spChg>
+        <pc:spChg chg="mod">
+          <ac:chgData name="Ben Fels" userId="96c832df0262a68b" providerId="LiveId" clId="{0E148846-4EDD-49EE-8355-9DD57AFB4E3E}" dt="2025-02-07T08:15:54.752" v="0" actId="208"/>
+          <ac:spMkLst>
+            <pc:docMk/>
+            <pc:sldMk cId="4159736329" sldId="271"/>
+            <ac:spMk id="8" creationId="{54CD6CA7-CE17-6F0A-7EAD-F1A5AA961C37}"/>
+          </ac:spMkLst>
+        </pc:spChg>
+        <pc:spChg chg="mod">
+          <ac:chgData name="Ben Fels" userId="96c832df0262a68b" providerId="LiveId" clId="{0E148846-4EDD-49EE-8355-9DD57AFB4E3E}" dt="2025-02-07T08:15:54.752" v="0" actId="208"/>
+          <ac:spMkLst>
+            <pc:docMk/>
+            <pc:sldMk cId="4159736329" sldId="271"/>
+            <ac:spMk id="9" creationId="{CE9B7FD7-E651-01C2-BFEF-E425F5738DE6}"/>
+          </ac:spMkLst>
+        </pc:spChg>
+        <pc:spChg chg="mod">
+          <ac:chgData name="Ben Fels" userId="96c832df0262a68b" providerId="LiveId" clId="{0E148846-4EDD-49EE-8355-9DD57AFB4E3E}" dt="2025-02-07T08:15:54.752" v="0" actId="208"/>
+          <ac:spMkLst>
+            <pc:docMk/>
+            <pc:sldMk cId="4159736329" sldId="271"/>
+            <ac:spMk id="13" creationId="{885CAAF1-6530-4613-6DAF-C78BEA51BE10}"/>
+          </ac:spMkLst>
+        </pc:spChg>
+        <pc:spChg chg="mod">
+          <ac:chgData name="Ben Fels" userId="96c832df0262a68b" providerId="LiveId" clId="{0E148846-4EDD-49EE-8355-9DD57AFB4E3E}" dt="2025-02-07T08:15:54.752" v="0" actId="208"/>
+          <ac:spMkLst>
+            <pc:docMk/>
+            <pc:sldMk cId="4159736329" sldId="271"/>
+            <ac:spMk id="14" creationId="{E1C68A6E-9370-760E-1D02-9ABA56C53B94}"/>
+          </ac:spMkLst>
+        </pc:spChg>
+        <pc:spChg chg="mod">
+          <ac:chgData name="Ben Fels" userId="96c832df0262a68b" providerId="LiveId" clId="{0E148846-4EDD-49EE-8355-9DD57AFB4E3E}" dt="2025-02-07T08:15:54.752" v="0" actId="208"/>
+          <ac:spMkLst>
+            <pc:docMk/>
+            <pc:sldMk cId="4159736329" sldId="271"/>
+            <ac:spMk id="18" creationId="{0E251CF4-F4CA-D5CD-189F-7CFDB827844A}"/>
+          </ac:spMkLst>
+        </pc:spChg>
+      </pc:sldChg>
+    </pc:docChg>
+  </pc:docChgLst>
   <pc:docChgLst>
     <pc:chgData name="Ben Fels" userId="96c832df0262a68b" providerId="LiveId" clId="{69F85E03-FBE9-4CCC-80F3-8F4E112D3773}"/>
     <pc:docChg chg="undo custSel addSld delSld modSld sldOrd">
@@ -131,14 +295,6 @@
           <pc:docMk/>
           <pc:sldMk cId="714504718" sldId="256"/>
         </pc:sldMkLst>
-        <pc:graphicFrameChg chg="add mod modGraphic">
-          <ac:chgData name="Ben Fels" userId="96c832df0262a68b" providerId="LiveId" clId="{69F85E03-FBE9-4CCC-80F3-8F4E112D3773}" dt="2025-01-18T12:18:48.848" v="37" actId="2084"/>
-          <ac:graphicFrameMkLst>
-            <pc:docMk/>
-            <pc:sldMk cId="714504718" sldId="256"/>
-            <ac:graphicFrameMk id="2" creationId="{C1B3176A-09D6-E0A8-4841-5405B8E58D64}"/>
-          </ac:graphicFrameMkLst>
-        </pc:graphicFrameChg>
       </pc:sldChg>
       <pc:sldChg chg="modSp add del">
         <pc:chgData name="Ben Fels" userId="96c832df0262a68b" providerId="LiveId" clId="{69F85E03-FBE9-4CCC-80F3-8F4E112D3773}" dt="2025-01-18T12:26:36.521" v="154" actId="47"/>
@@ -146,14 +302,6 @@
           <pc:docMk/>
           <pc:sldMk cId="333037814" sldId="257"/>
         </pc:sldMkLst>
-        <pc:graphicFrameChg chg="mod">
-          <ac:chgData name="Ben Fels" userId="96c832df0262a68b" providerId="LiveId" clId="{69F85E03-FBE9-4CCC-80F3-8F4E112D3773}" dt="2025-01-18T12:19:33.060" v="55" actId="20577"/>
-          <ac:graphicFrameMkLst>
-            <pc:docMk/>
-            <pc:sldMk cId="333037814" sldId="257"/>
-            <ac:graphicFrameMk id="2" creationId="{19E6B29F-A684-44EF-D394-AD36D0223531}"/>
-          </ac:graphicFrameMkLst>
-        </pc:graphicFrameChg>
       </pc:sldChg>
       <pc:sldChg chg="addSp delSp modSp new del mod">
         <pc:chgData name="Ben Fels" userId="96c832df0262a68b" providerId="LiveId" clId="{69F85E03-FBE9-4CCC-80F3-8F4E112D3773}" dt="2025-01-18T12:28:08.595" v="193" actId="47"/>
@@ -161,14 +309,6 @@
           <pc:docMk/>
           <pc:sldMk cId="2575825843" sldId="258"/>
         </pc:sldMkLst>
-        <pc:spChg chg="add del mod">
-          <ac:chgData name="Ben Fels" userId="96c832df0262a68b" providerId="LiveId" clId="{69F85E03-FBE9-4CCC-80F3-8F4E112D3773}" dt="2025-01-18T12:24:42.363" v="82" actId="21"/>
-          <ac:spMkLst>
-            <pc:docMk/>
-            <pc:sldMk cId="2575825843" sldId="258"/>
-            <ac:spMk id="2" creationId="{48093144-7F1A-991B-C330-54985C8BD195}"/>
-          </ac:spMkLst>
-        </pc:spChg>
       </pc:sldChg>
       <pc:sldChg chg="addSp delSp modSp new del mod ord">
         <pc:chgData name="Ben Fels" userId="96c832df0262a68b" providerId="LiveId" clId="{69F85E03-FBE9-4CCC-80F3-8F4E112D3773}" dt="2025-01-18T12:55:35.616" v="401" actId="47"/>
@@ -176,30 +316,6 @@
           <pc:docMk/>
           <pc:sldMk cId="2443801549" sldId="259"/>
         </pc:sldMkLst>
-        <pc:spChg chg="mod">
-          <ac:chgData name="Ben Fels" userId="96c832df0262a68b" providerId="LiveId" clId="{69F85E03-FBE9-4CCC-80F3-8F4E112D3773}" dt="2025-01-18T12:24:52.803" v="96" actId="20577"/>
-          <ac:spMkLst>
-            <pc:docMk/>
-            <pc:sldMk cId="2443801549" sldId="259"/>
-            <ac:spMk id="2" creationId="{EA19FACD-38F2-F825-45A7-E16B9BF07DFF}"/>
-          </ac:spMkLst>
-        </pc:spChg>
-        <pc:spChg chg="del">
-          <ac:chgData name="Ben Fels" userId="96c832df0262a68b" providerId="LiveId" clId="{69F85E03-FBE9-4CCC-80F3-8F4E112D3773}" dt="2025-01-18T12:24:43.711" v="83"/>
-          <ac:spMkLst>
-            <pc:docMk/>
-            <pc:sldMk cId="2443801549" sldId="259"/>
-            <ac:spMk id="3" creationId="{9098A474-176E-C789-B5CC-FC5C4EBAE898}"/>
-          </ac:spMkLst>
-        </pc:spChg>
-        <pc:spChg chg="add mod">
-          <ac:chgData name="Ben Fels" userId="96c832df0262a68b" providerId="LiveId" clId="{69F85E03-FBE9-4CCC-80F3-8F4E112D3773}" dt="2025-01-18T12:26:43.362" v="156" actId="20577"/>
-          <ac:spMkLst>
-            <pc:docMk/>
-            <pc:sldMk cId="2443801549" sldId="259"/>
-            <ac:spMk id="4" creationId="{48093144-7F1A-991B-C330-54985C8BD195}"/>
-          </ac:spMkLst>
-        </pc:spChg>
       </pc:sldChg>
       <pc:sldChg chg="addSp modSp add del mod">
         <pc:chgData name="Ben Fels" userId="96c832df0262a68b" providerId="LiveId" clId="{69F85E03-FBE9-4CCC-80F3-8F4E112D3773}" dt="2025-01-18T12:55:36.165" v="402" actId="47"/>
@@ -207,30 +323,6 @@
           <pc:docMk/>
           <pc:sldMk cId="3755276684" sldId="260"/>
         </pc:sldMkLst>
-        <pc:spChg chg="mod">
-          <ac:chgData name="Ben Fels" userId="96c832df0262a68b" providerId="LiveId" clId="{69F85E03-FBE9-4CCC-80F3-8F4E112D3773}" dt="2025-01-18T12:24:57.258" v="105" actId="20577"/>
-          <ac:spMkLst>
-            <pc:docMk/>
-            <pc:sldMk cId="3755276684" sldId="260"/>
-            <ac:spMk id="2" creationId="{0FD49F9B-759B-84AB-5B20-258E80594FD4}"/>
-          </ac:spMkLst>
-        </pc:spChg>
-        <pc:spChg chg="add mod">
-          <ac:chgData name="Ben Fels" userId="96c832df0262a68b" providerId="LiveId" clId="{69F85E03-FBE9-4CCC-80F3-8F4E112D3773}" dt="2025-01-18T12:25:31.969" v="124" actId="1076"/>
-          <ac:spMkLst>
-            <pc:docMk/>
-            <pc:sldMk cId="3755276684" sldId="260"/>
-            <ac:spMk id="3" creationId="{37572133-1A13-18DB-10E6-AF7865E44070}"/>
-          </ac:spMkLst>
-        </pc:spChg>
-        <pc:spChg chg="mod">
-          <ac:chgData name="Ben Fels" userId="96c832df0262a68b" providerId="LiveId" clId="{69F85E03-FBE9-4CCC-80F3-8F4E112D3773}" dt="2025-01-18T12:25:29.432" v="123" actId="1076"/>
-          <ac:spMkLst>
-            <pc:docMk/>
-            <pc:sldMk cId="3755276684" sldId="260"/>
-            <ac:spMk id="4" creationId="{031573FD-94CC-BF9D-1243-84AE025D2CD2}"/>
-          </ac:spMkLst>
-        </pc:spChg>
       </pc:sldChg>
       <pc:sldChg chg="modSp add del mod">
         <pc:chgData name="Ben Fels" userId="96c832df0262a68b" providerId="LiveId" clId="{69F85E03-FBE9-4CCC-80F3-8F4E112D3773}" dt="2025-01-18T12:55:36.604" v="403" actId="47"/>
@@ -238,30 +330,6 @@
           <pc:docMk/>
           <pc:sldMk cId="984521873" sldId="261"/>
         </pc:sldMkLst>
-        <pc:spChg chg="mod">
-          <ac:chgData name="Ben Fels" userId="96c832df0262a68b" providerId="LiveId" clId="{69F85E03-FBE9-4CCC-80F3-8F4E112D3773}" dt="2025-01-18T12:25:56.869" v="139" actId="20577"/>
-          <ac:spMkLst>
-            <pc:docMk/>
-            <pc:sldMk cId="984521873" sldId="261"/>
-            <ac:spMk id="2" creationId="{6C13964A-518B-4A5D-A085-1171F09BE70B}"/>
-          </ac:spMkLst>
-        </pc:spChg>
-        <pc:spChg chg="mod">
-          <ac:chgData name="Ben Fels" userId="96c832df0262a68b" providerId="LiveId" clId="{69F85E03-FBE9-4CCC-80F3-8F4E112D3773}" dt="2025-01-18T12:26:25.264" v="153" actId="1076"/>
-          <ac:spMkLst>
-            <pc:docMk/>
-            <pc:sldMk cId="984521873" sldId="261"/>
-            <ac:spMk id="3" creationId="{C4194659-F648-E527-37E2-170AA5522C9A}"/>
-          </ac:spMkLst>
-        </pc:spChg>
-        <pc:spChg chg="mod">
-          <ac:chgData name="Ben Fels" userId="96c832df0262a68b" providerId="LiveId" clId="{69F85E03-FBE9-4CCC-80F3-8F4E112D3773}" dt="2025-01-18T12:26:22.722" v="152" actId="1076"/>
-          <ac:spMkLst>
-            <pc:docMk/>
-            <pc:sldMk cId="984521873" sldId="261"/>
-            <ac:spMk id="4" creationId="{FBC216BE-73F2-7E5F-F0C2-45593071F277}"/>
-          </ac:spMkLst>
-        </pc:spChg>
       </pc:sldChg>
       <pc:sldChg chg="addSp modSp add del mod">
         <pc:chgData name="Ben Fels" userId="96c832df0262a68b" providerId="LiveId" clId="{69F85E03-FBE9-4CCC-80F3-8F4E112D3773}" dt="2025-01-18T12:55:37.170" v="404" actId="47"/>
@@ -269,30 +337,6 @@
           <pc:docMk/>
           <pc:sldMk cId="2277443223" sldId="262"/>
         </pc:sldMkLst>
-        <pc:spChg chg="mod">
-          <ac:chgData name="Ben Fels" userId="96c832df0262a68b" providerId="LiveId" clId="{69F85E03-FBE9-4CCC-80F3-8F4E112D3773}" dt="2025-01-18T12:26:06.407" v="150" actId="20577"/>
-          <ac:spMkLst>
-            <pc:docMk/>
-            <pc:sldMk cId="2277443223" sldId="262"/>
-            <ac:spMk id="2" creationId="{B132F346-CA5F-3393-812C-44431A71292A}"/>
-          </ac:spMkLst>
-        </pc:spChg>
-        <pc:spChg chg="mod">
-          <ac:chgData name="Ben Fels" userId="96c832df0262a68b" providerId="LiveId" clId="{69F85E03-FBE9-4CCC-80F3-8F4E112D3773}" dt="2025-01-18T12:27:06.427" v="165" actId="20577"/>
-          <ac:spMkLst>
-            <pc:docMk/>
-            <pc:sldMk cId="2277443223" sldId="262"/>
-            <ac:spMk id="3" creationId="{12426622-45E4-7B1D-45C5-F69A0B39C65B}"/>
-          </ac:spMkLst>
-        </pc:spChg>
-        <pc:spChg chg="add mod">
-          <ac:chgData name="Ben Fels" userId="96c832df0262a68b" providerId="LiveId" clId="{69F85E03-FBE9-4CCC-80F3-8F4E112D3773}" dt="2025-01-18T12:27:03.043" v="158" actId="1076"/>
-          <ac:spMkLst>
-            <pc:docMk/>
-            <pc:sldMk cId="2277443223" sldId="262"/>
-            <ac:spMk id="5" creationId="{ECB64DAA-56A2-BCD0-3083-77689E08BB64}"/>
-          </ac:spMkLst>
-        </pc:spChg>
       </pc:sldChg>
       <pc:sldChg chg="addSp delSp modSp add del mod">
         <pc:chgData name="Ben Fels" userId="96c832df0262a68b" providerId="LiveId" clId="{69F85E03-FBE9-4CCC-80F3-8F4E112D3773}" dt="2025-01-18T12:55:33.309" v="399" actId="47"/>
@@ -300,38 +344,6 @@
           <pc:docMk/>
           <pc:sldMk cId="4279191262" sldId="263"/>
         </pc:sldMkLst>
-        <pc:spChg chg="mod">
-          <ac:chgData name="Ben Fels" userId="96c832df0262a68b" providerId="LiveId" clId="{69F85E03-FBE9-4CCC-80F3-8F4E112D3773}" dt="2025-01-18T12:39:58.323" v="247" actId="6549"/>
-          <ac:spMkLst>
-            <pc:docMk/>
-            <pc:sldMk cId="4279191262" sldId="263"/>
-            <ac:spMk id="2" creationId="{8B8DC1BB-C291-01E9-AD8E-3DCD372E33E0}"/>
-          </ac:spMkLst>
-        </pc:spChg>
-        <pc:spChg chg="add del mod">
-          <ac:chgData name="Ben Fels" userId="96c832df0262a68b" providerId="LiveId" clId="{69F85E03-FBE9-4CCC-80F3-8F4E112D3773}" dt="2025-01-18T12:40:24.154" v="259"/>
-          <ac:spMkLst>
-            <pc:docMk/>
-            <pc:sldMk cId="4279191262" sldId="263"/>
-            <ac:spMk id="3" creationId="{BE5AF176-5D06-522D-0ADA-D4080C2EB065}"/>
-          </ac:spMkLst>
-        </pc:spChg>
-        <pc:spChg chg="mod">
-          <ac:chgData name="Ben Fels" userId="96c832df0262a68b" providerId="LiveId" clId="{69F85E03-FBE9-4CCC-80F3-8F4E112D3773}" dt="2025-01-18T12:40:26.935" v="260"/>
-          <ac:spMkLst>
-            <pc:docMk/>
-            <pc:sldMk cId="4279191262" sldId="263"/>
-            <ac:spMk id="4" creationId="{43EE7AE3-04E5-81DB-322D-4D4D0E1CFF3B}"/>
-          </ac:spMkLst>
-        </pc:spChg>
-        <pc:spChg chg="mod">
-          <ac:chgData name="Ben Fels" userId="96c832df0262a68b" providerId="LiveId" clId="{69F85E03-FBE9-4CCC-80F3-8F4E112D3773}" dt="2025-01-18T12:40:31.781" v="261"/>
-          <ac:spMkLst>
-            <pc:docMk/>
-            <pc:sldMk cId="4279191262" sldId="263"/>
-            <ac:spMk id="5" creationId="{B5EFA4DF-F4AD-54E5-318C-465CA6342713}"/>
-          </ac:spMkLst>
-        </pc:spChg>
       </pc:sldChg>
       <pc:sldChg chg="modSp new del mod">
         <pc:chgData name="Ben Fels" userId="96c832df0262a68b" providerId="LiveId" clId="{69F85E03-FBE9-4CCC-80F3-8F4E112D3773}" dt="2025-01-18T12:55:33.309" v="399" actId="47"/>
@@ -339,14 +351,6 @@
           <pc:docMk/>
           <pc:sldMk cId="683877163" sldId="264"/>
         </pc:sldMkLst>
-        <pc:spChg chg="mod">
-          <ac:chgData name="Ben Fels" userId="96c832df0262a68b" providerId="LiveId" clId="{69F85E03-FBE9-4CCC-80F3-8F4E112D3773}" dt="2025-01-18T12:27:45.970" v="178" actId="20577"/>
-          <ac:spMkLst>
-            <pc:docMk/>
-            <pc:sldMk cId="683877163" sldId="264"/>
-            <ac:spMk id="2" creationId="{5AD46EAE-A2C5-6FFA-0B29-FB624F931229}"/>
-          </ac:spMkLst>
-        </pc:spChg>
       </pc:sldChg>
       <pc:sldChg chg="new del ord">
         <pc:chgData name="Ben Fels" userId="96c832df0262a68b" providerId="LiveId" clId="{69F85E03-FBE9-4CCC-80F3-8F4E112D3773}" dt="2025-01-18T12:27:58.319" v="192" actId="47"/>
@@ -361,14 +365,6 @@
           <pc:docMk/>
           <pc:sldMk cId="3348516197" sldId="266"/>
         </pc:sldMkLst>
-        <pc:spChg chg="mod">
-          <ac:chgData name="Ben Fels" userId="96c832df0262a68b" providerId="LiveId" clId="{69F85E03-FBE9-4CCC-80F3-8F4E112D3773}" dt="2025-01-18T12:27:56.759" v="191" actId="20577"/>
-          <ac:spMkLst>
-            <pc:docMk/>
-            <pc:sldMk cId="3348516197" sldId="266"/>
-            <ac:spMk id="2" creationId="{5CE8ADCD-7C16-5B82-47CB-CE16F58CEF86}"/>
-          </ac:spMkLst>
-        </pc:spChg>
       </pc:sldChg>
       <pc:sldChg chg="addSp delSp modSp add del mod ord">
         <pc:chgData name="Ben Fels" userId="96c832df0262a68b" providerId="LiveId" clId="{69F85E03-FBE9-4CCC-80F3-8F4E112D3773}" dt="2025-01-18T12:55:37.703" v="405" actId="47"/>
@@ -376,38 +372,6 @@
           <pc:docMk/>
           <pc:sldMk cId="2326956069" sldId="267"/>
         </pc:sldMkLst>
-        <pc:spChg chg="mod">
-          <ac:chgData name="Ben Fels" userId="96c832df0262a68b" providerId="LiveId" clId="{69F85E03-FBE9-4CCC-80F3-8F4E112D3773}" dt="2025-01-18T12:28:18.578" v="198" actId="20577"/>
-          <ac:spMkLst>
-            <pc:docMk/>
-            <pc:sldMk cId="2326956069" sldId="267"/>
-            <ac:spMk id="2" creationId="{3E1036AC-0AF5-1872-FAA9-32A14C6A4D6A}"/>
-          </ac:spMkLst>
-        </pc:spChg>
-        <pc:spChg chg="add del mod">
-          <ac:chgData name="Ben Fels" userId="96c832df0262a68b" providerId="LiveId" clId="{69F85E03-FBE9-4CCC-80F3-8F4E112D3773}" dt="2025-01-18T12:28:29.782" v="223" actId="20577"/>
-          <ac:spMkLst>
-            <pc:docMk/>
-            <pc:sldMk cId="2326956069" sldId="267"/>
-            <ac:spMk id="3" creationId="{FEEA5EFC-953E-320C-8A93-FE69CC7FE77B}"/>
-          </ac:spMkLst>
-        </pc:spChg>
-        <pc:spChg chg="mod">
-          <ac:chgData name="Ben Fels" userId="96c832df0262a68b" providerId="LiveId" clId="{69F85E03-FBE9-4CCC-80F3-8F4E112D3773}" dt="2025-01-18T12:28:38.923" v="242" actId="20577"/>
-          <ac:spMkLst>
-            <pc:docMk/>
-            <pc:sldMk cId="2326956069" sldId="267"/>
-            <ac:spMk id="4" creationId="{67B9BA54-CED0-AC5A-A0E3-44EFA420DFA7}"/>
-          </ac:spMkLst>
-        </pc:spChg>
-        <pc:spChg chg="del">
-          <ac:chgData name="Ben Fels" userId="96c832df0262a68b" providerId="LiveId" clId="{69F85E03-FBE9-4CCC-80F3-8F4E112D3773}" dt="2025-01-18T12:28:41.823" v="243" actId="478"/>
-          <ac:spMkLst>
-            <pc:docMk/>
-            <pc:sldMk cId="2326956069" sldId="267"/>
-            <ac:spMk id="5" creationId="{187269F2-6B3E-0C7F-75A4-6324863A42FA}"/>
-          </ac:spMkLst>
-        </pc:spChg>
       </pc:sldChg>
       <pc:sldChg chg="modSp add del mod">
         <pc:chgData name="Ben Fels" userId="96c832df0262a68b" providerId="LiveId" clId="{69F85E03-FBE9-4CCC-80F3-8F4E112D3773}" dt="2025-01-18T12:55:33.309" v="399" actId="47"/>
@@ -415,22 +379,6 @@
           <pc:docMk/>
           <pc:sldMk cId="3448024084" sldId="268"/>
         </pc:sldMkLst>
-        <pc:spChg chg="mod">
-          <ac:chgData name="Ben Fels" userId="96c832df0262a68b" providerId="LiveId" clId="{69F85E03-FBE9-4CCC-80F3-8F4E112D3773}" dt="2025-01-18T12:29:42.852" v="244" actId="20577"/>
-          <ac:spMkLst>
-            <pc:docMk/>
-            <pc:sldMk cId="3448024084" sldId="268"/>
-            <ac:spMk id="2" creationId="{5172F1FC-437D-ADFF-1568-520B5E9BB7DB}"/>
-          </ac:spMkLst>
-        </pc:spChg>
-        <pc:spChg chg="mod">
-          <ac:chgData name="Ben Fels" userId="96c832df0262a68b" providerId="LiveId" clId="{69F85E03-FBE9-4CCC-80F3-8F4E112D3773}" dt="2025-01-18T12:29:48.374" v="245"/>
-          <ac:spMkLst>
-            <pc:docMk/>
-            <pc:sldMk cId="3448024084" sldId="268"/>
-            <ac:spMk id="5" creationId="{C78D51BE-D886-6323-6F7C-029749CB9AFF}"/>
-          </ac:spMkLst>
-        </pc:spChg>
       </pc:sldChg>
       <pc:sldChg chg="addSp modSp add del mod">
         <pc:chgData name="Ben Fels" userId="96c832df0262a68b" providerId="LiveId" clId="{69F85E03-FBE9-4CCC-80F3-8F4E112D3773}" dt="2025-01-18T12:55:33.309" v="399" actId="47"/>
@@ -438,46 +386,6 @@
           <pc:docMk/>
           <pc:sldMk cId="319509468" sldId="269"/>
         </pc:sldMkLst>
-        <pc:spChg chg="mod">
-          <ac:chgData name="Ben Fels" userId="96c832df0262a68b" providerId="LiveId" clId="{69F85E03-FBE9-4CCC-80F3-8F4E112D3773}" dt="2025-01-18T12:40:08.169" v="256" actId="20577"/>
-          <ac:spMkLst>
-            <pc:docMk/>
-            <pc:sldMk cId="319509468" sldId="269"/>
-            <ac:spMk id="2" creationId="{20D68EC3-3416-3BB9-9E03-E06A6F8A58AA}"/>
-          </ac:spMkLst>
-        </pc:spChg>
-        <pc:spChg chg="mod">
-          <ac:chgData name="Ben Fels" userId="96c832df0262a68b" providerId="LiveId" clId="{69F85E03-FBE9-4CCC-80F3-8F4E112D3773}" dt="2025-01-18T12:42:45.185" v="308" actId="207"/>
-          <ac:spMkLst>
-            <pc:docMk/>
-            <pc:sldMk cId="319509468" sldId="269"/>
-            <ac:spMk id="3" creationId="{420EEEEE-306B-5F23-F3F1-E991BFE8DFB4}"/>
-          </ac:spMkLst>
-        </pc:spChg>
-        <pc:spChg chg="mod">
-          <ac:chgData name="Ben Fels" userId="96c832df0262a68b" providerId="LiveId" clId="{69F85E03-FBE9-4CCC-80F3-8F4E112D3773}" dt="2025-01-18T12:42:45.185" v="308" actId="207"/>
-          <ac:spMkLst>
-            <pc:docMk/>
-            <pc:sldMk cId="319509468" sldId="269"/>
-            <ac:spMk id="4" creationId="{F9A4416C-048A-13E8-5CB4-4BEDD5E33DE4}"/>
-          </ac:spMkLst>
-        </pc:spChg>
-        <pc:spChg chg="mod">
-          <ac:chgData name="Ben Fels" userId="96c832df0262a68b" providerId="LiveId" clId="{69F85E03-FBE9-4CCC-80F3-8F4E112D3773}" dt="2025-01-18T12:42:45.185" v="308" actId="207"/>
-          <ac:spMkLst>
-            <pc:docMk/>
-            <pc:sldMk cId="319509468" sldId="269"/>
-            <ac:spMk id="5" creationId="{2D75E248-A05F-1B2B-B794-EBE5D85D6E2E}"/>
-          </ac:spMkLst>
-        </pc:spChg>
-        <pc:spChg chg="add mod">
-          <ac:chgData name="Ben Fels" userId="96c832df0262a68b" providerId="LiveId" clId="{69F85E03-FBE9-4CCC-80F3-8F4E112D3773}" dt="2025-01-18T12:42:45.185" v="308" actId="207"/>
-          <ac:spMkLst>
-            <pc:docMk/>
-            <pc:sldMk cId="319509468" sldId="269"/>
-            <ac:spMk id="6" creationId="{0FE47E78-35E3-3AD0-FA6B-F28DCED91FF9}"/>
-          </ac:spMkLst>
-        </pc:spChg>
       </pc:sldChg>
       <pc:sldChg chg="addSp delSp modSp add mod">
         <pc:chgData name="Ben Fels" userId="96c832df0262a68b" providerId="LiveId" clId="{69F85E03-FBE9-4CCC-80F3-8F4E112D3773}" dt="2025-01-18T12:46:36.150" v="374" actId="27636"/>
@@ -557,14 +465,6 @@
             <ac:spMk id="10" creationId="{98E8552C-8FB8-D939-7C07-F3C862A66DA5}"/>
           </ac:spMkLst>
         </pc:spChg>
-        <pc:spChg chg="add del mod">
-          <ac:chgData name="Ben Fels" userId="96c832df0262a68b" providerId="LiveId" clId="{69F85E03-FBE9-4CCC-80F3-8F4E112D3773}" dt="2025-01-18T12:44:55.877" v="341" actId="478"/>
-          <ac:spMkLst>
-            <pc:docMk/>
-            <pc:sldMk cId="3472356501" sldId="270"/>
-            <ac:spMk id="11" creationId="{A90A462D-3C37-3736-5AB1-CA77844CF744}"/>
-          </ac:spMkLst>
-        </pc:spChg>
         <pc:spChg chg="add mod">
           <ac:chgData name="Ben Fels" userId="96c832df0262a68b" providerId="LiveId" clId="{69F85E03-FBE9-4CCC-80F3-8F4E112D3773}" dt="2025-01-18T12:45:32.219" v="356" actId="20577"/>
           <ac:spMkLst>
@@ -621,14 +521,6 @@
             <ac:spMk id="18" creationId="{75000FA0-591A-161C-417E-B83BEA6073A7}"/>
           </ac:spMkLst>
         </pc:spChg>
-        <pc:spChg chg="add del mod">
-          <ac:chgData name="Ben Fels" userId="96c832df0262a68b" providerId="LiveId" clId="{69F85E03-FBE9-4CCC-80F3-8F4E112D3773}" dt="2025-01-18T12:46:26.101" v="372" actId="478"/>
-          <ac:spMkLst>
-            <pc:docMk/>
-            <pc:sldMk cId="3472356501" sldId="270"/>
-            <ac:spMk id="19" creationId="{CF90BB51-BE4C-062F-EE69-4BE0AD690534}"/>
-          </ac:spMkLst>
-        </pc:spChg>
       </pc:sldChg>
       <pc:sldChg chg="delSp modSp add mod ord">
         <pc:chgData name="Ben Fels" userId="96c832df0262a68b" providerId="LiveId" clId="{69F85E03-FBE9-4CCC-80F3-8F4E112D3773}" dt="2025-01-18T12:47:57.781" v="398" actId="478"/>
@@ -644,28 +536,12 @@
             <ac:spMk id="2" creationId="{3322D42F-EDB4-2324-835A-554DD8F1B031}"/>
           </ac:spMkLst>
         </pc:spChg>
-        <pc:spChg chg="del">
-          <ac:chgData name="Ben Fels" userId="96c832df0262a68b" providerId="LiveId" clId="{69F85E03-FBE9-4CCC-80F3-8F4E112D3773}" dt="2025-01-18T12:47:57.781" v="398" actId="478"/>
-          <ac:spMkLst>
-            <pc:docMk/>
-            <pc:sldMk cId="4159736329" sldId="271"/>
-            <ac:spMk id="6" creationId="{3368783B-A773-A43E-0F6E-498A0A20E932}"/>
-          </ac:spMkLst>
-        </pc:spChg>
         <pc:spChg chg="mod">
           <ac:chgData name="Ben Fels" userId="96c832df0262a68b" providerId="LiveId" clId="{69F85E03-FBE9-4CCC-80F3-8F4E112D3773}" dt="2025-01-18T12:47:27.502" v="390" actId="20577"/>
           <ac:spMkLst>
             <pc:docMk/>
             <pc:sldMk cId="4159736329" sldId="271"/>
             <ac:spMk id="7" creationId="{CAE4FE49-0AD3-7D77-C223-21ED23D49C1A}"/>
-          </ac:spMkLst>
-        </pc:spChg>
-        <pc:spChg chg="del">
-          <ac:chgData name="Ben Fels" userId="96c832df0262a68b" providerId="LiveId" clId="{69F85E03-FBE9-4CCC-80F3-8F4E112D3773}" dt="2025-01-18T12:47:56.129" v="397" actId="478"/>
-          <ac:spMkLst>
-            <pc:docMk/>
-            <pc:sldMk cId="4159736329" sldId="271"/>
-            <ac:spMk id="10" creationId="{7AEC3D84-4932-322A-05A7-D58B6C051E06}"/>
           </ac:spMkLst>
         </pc:spChg>
         <pc:spChg chg="mod">
@@ -676,28 +552,12 @@
             <ac:spMk id="12" creationId="{ACA1084F-EE62-19EC-6308-FE9E2A332268}"/>
           </ac:spMkLst>
         </pc:spChg>
-        <pc:spChg chg="del mod">
-          <ac:chgData name="Ben Fels" userId="96c832df0262a68b" providerId="LiveId" clId="{69F85E03-FBE9-4CCC-80F3-8F4E112D3773}" dt="2025-01-18T12:47:55.389" v="396" actId="478"/>
-          <ac:spMkLst>
-            <pc:docMk/>
-            <pc:sldMk cId="4159736329" sldId="271"/>
-            <ac:spMk id="15" creationId="{8764D584-29A9-24EB-7C0D-D68C273F26E4}"/>
-          </ac:spMkLst>
-        </pc:spChg>
         <pc:spChg chg="mod">
           <ac:chgData name="Ben Fels" userId="96c832df0262a68b" providerId="LiveId" clId="{69F85E03-FBE9-4CCC-80F3-8F4E112D3773}" dt="2025-01-18T12:47:14.238" v="381" actId="20577"/>
           <ac:spMkLst>
             <pc:docMk/>
             <pc:sldMk cId="4159736329" sldId="271"/>
             <ac:spMk id="16" creationId="{3C42945D-8750-F408-A023-6D78348DFB4D}"/>
-          </ac:spMkLst>
-        </pc:spChg>
-        <pc:spChg chg="del">
-          <ac:chgData name="Ben Fels" userId="96c832df0262a68b" providerId="LiveId" clId="{69F85E03-FBE9-4CCC-80F3-8F4E112D3773}" dt="2025-01-18T12:47:21.474" v="386" actId="478"/>
-          <ac:spMkLst>
-            <pc:docMk/>
-            <pc:sldMk cId="4159736329" sldId="271"/>
-            <ac:spMk id="17" creationId="{9DAF0C56-2F68-4115-505B-1F970509D9AC}"/>
           </ac:spMkLst>
         </pc:spChg>
       </pc:sldChg>
@@ -853,7 +713,7 @@
           <a:p>
             <a:fld id="{4C641939-4042-4EEC-A628-AF9643437C88}" type="datetimeFigureOut">
               <a:rPr lang="de-DE" smtClean="0"/>
-              <a:t>18.01.2025</a:t>
+              <a:t>07.02.2025</a:t>
             </a:fld>
             <a:endParaRPr lang="de-DE"/>
           </a:p>
@@ -1051,7 +911,7 @@
           <a:p>
             <a:fld id="{4C641939-4042-4EEC-A628-AF9643437C88}" type="datetimeFigureOut">
               <a:rPr lang="de-DE" smtClean="0"/>
-              <a:t>18.01.2025</a:t>
+              <a:t>07.02.2025</a:t>
             </a:fld>
             <a:endParaRPr lang="de-DE"/>
           </a:p>
@@ -1259,7 +1119,7 @@
           <a:p>
             <a:fld id="{4C641939-4042-4EEC-A628-AF9643437C88}" type="datetimeFigureOut">
               <a:rPr lang="de-DE" smtClean="0"/>
-              <a:t>18.01.2025</a:t>
+              <a:t>07.02.2025</a:t>
             </a:fld>
             <a:endParaRPr lang="de-DE"/>
           </a:p>
@@ -1457,7 +1317,7 @@
           <a:p>
             <a:fld id="{4C641939-4042-4EEC-A628-AF9643437C88}" type="datetimeFigureOut">
               <a:rPr lang="de-DE" smtClean="0"/>
-              <a:t>18.01.2025</a:t>
+              <a:t>07.02.2025</a:t>
             </a:fld>
             <a:endParaRPr lang="de-DE"/>
           </a:p>
@@ -1732,7 +1592,7 @@
           <a:p>
             <a:fld id="{4C641939-4042-4EEC-A628-AF9643437C88}" type="datetimeFigureOut">
               <a:rPr lang="de-DE" smtClean="0"/>
-              <a:t>18.01.2025</a:t>
+              <a:t>07.02.2025</a:t>
             </a:fld>
             <a:endParaRPr lang="de-DE"/>
           </a:p>
@@ -1997,7 +1857,7 @@
           <a:p>
             <a:fld id="{4C641939-4042-4EEC-A628-AF9643437C88}" type="datetimeFigureOut">
               <a:rPr lang="de-DE" smtClean="0"/>
-              <a:t>18.01.2025</a:t>
+              <a:t>07.02.2025</a:t>
             </a:fld>
             <a:endParaRPr lang="de-DE"/>
           </a:p>
@@ -2409,7 +2269,7 @@
           <a:p>
             <a:fld id="{4C641939-4042-4EEC-A628-AF9643437C88}" type="datetimeFigureOut">
               <a:rPr lang="de-DE" smtClean="0"/>
-              <a:t>18.01.2025</a:t>
+              <a:t>07.02.2025</a:t>
             </a:fld>
             <a:endParaRPr lang="de-DE"/>
           </a:p>
@@ -2550,7 +2410,7 @@
           <a:p>
             <a:fld id="{4C641939-4042-4EEC-A628-AF9643437C88}" type="datetimeFigureOut">
               <a:rPr lang="de-DE" smtClean="0"/>
-              <a:t>18.01.2025</a:t>
+              <a:t>07.02.2025</a:t>
             </a:fld>
             <a:endParaRPr lang="de-DE"/>
           </a:p>
@@ -2663,7 +2523,7 @@
           <a:p>
             <a:fld id="{4C641939-4042-4EEC-A628-AF9643437C88}" type="datetimeFigureOut">
               <a:rPr lang="de-DE" smtClean="0"/>
-              <a:t>18.01.2025</a:t>
+              <a:t>07.02.2025</a:t>
             </a:fld>
             <a:endParaRPr lang="de-DE"/>
           </a:p>
@@ -2974,7 +2834,7 @@
           <a:p>
             <a:fld id="{4C641939-4042-4EEC-A628-AF9643437C88}" type="datetimeFigureOut">
               <a:rPr lang="de-DE" smtClean="0"/>
-              <a:t>18.01.2025</a:t>
+              <a:t>07.02.2025</a:t>
             </a:fld>
             <a:endParaRPr lang="de-DE"/>
           </a:p>
@@ -3262,7 +3122,7 @@
           <a:p>
             <a:fld id="{4C641939-4042-4EEC-A628-AF9643437C88}" type="datetimeFigureOut">
               <a:rPr lang="de-DE" smtClean="0"/>
-              <a:t>18.01.2025</a:t>
+              <a:t>07.02.2025</a:t>
             </a:fld>
             <a:endParaRPr lang="de-DE"/>
           </a:p>
@@ -3503,7 +3363,7 @@
           <a:p>
             <a:fld id="{4C641939-4042-4EEC-A628-AF9643437C88}" type="datetimeFigureOut">
               <a:rPr lang="de-DE" smtClean="0"/>
-              <a:t>18.01.2025</a:t>
+              <a:t>07.02.2025</a:t>
             </a:fld>
             <a:endParaRPr lang="de-DE"/>
           </a:p>
@@ -3986,6 +3846,11 @@
             <a:avLst/>
           </a:prstGeom>
           <a:noFill/>
+          <a:ln>
+            <a:solidFill>
+              <a:schemeClr val="tx1"/>
+            </a:solidFill>
+          </a:ln>
         </p:spPr>
         <p:style>
           <a:lnRef idx="2">
@@ -4046,6 +3911,11 @@
             <a:avLst/>
           </a:prstGeom>
           <a:noFill/>
+          <a:ln>
+            <a:solidFill>
+              <a:schemeClr val="tx1"/>
+            </a:solidFill>
+          </a:ln>
         </p:spPr>
         <p:style>
           <a:lnRef idx="2">
@@ -4270,6 +4140,11 @@
             <a:avLst/>
           </a:prstGeom>
           <a:noFill/>
+          <a:ln>
+            <a:solidFill>
+              <a:schemeClr val="tx1"/>
+            </a:solidFill>
+          </a:ln>
         </p:spPr>
         <p:style>
           <a:lnRef idx="2">
@@ -4548,6 +4423,11 @@
             <a:avLst/>
           </a:prstGeom>
           <a:noFill/>
+          <a:ln>
+            <a:solidFill>
+              <a:schemeClr val="tx1"/>
+            </a:solidFill>
+          </a:ln>
         </p:spPr>
         <p:style>
           <a:lnRef idx="2">
@@ -4772,6 +4652,11 @@
             <a:avLst/>
           </a:prstGeom>
           <a:noFill/>
+          <a:ln>
+            <a:solidFill>
+              <a:schemeClr val="tx1"/>
+            </a:solidFill>
+          </a:ln>
         </p:spPr>
         <p:style>
           <a:lnRef idx="2">
@@ -5050,6 +4935,11 @@
             <a:avLst/>
           </a:prstGeom>
           <a:noFill/>
+          <a:ln>
+            <a:solidFill>
+              <a:schemeClr val="tx1"/>
+            </a:solidFill>
+          </a:ln>
         </p:spPr>
         <p:style>
           <a:lnRef idx="2">
@@ -5274,6 +5164,11 @@
             <a:avLst/>
           </a:prstGeom>
           <a:noFill/>
+          <a:ln>
+            <a:solidFill>
+              <a:schemeClr val="tx1"/>
+            </a:solidFill>
+          </a:ln>
         </p:spPr>
         <p:style>
           <a:lnRef idx="2">
@@ -5552,6 +5447,11 @@
             <a:avLst/>
           </a:prstGeom>
           <a:noFill/>
+          <a:ln>
+            <a:solidFill>
+              <a:schemeClr val="tx1"/>
+            </a:solidFill>
+          </a:ln>
         </p:spPr>
         <p:style>
           <a:lnRef idx="2">
@@ -5849,6 +5749,11 @@
             <a:avLst/>
           </a:prstGeom>
           <a:noFill/>
+          <a:ln>
+            <a:solidFill>
+              <a:schemeClr val="tx1"/>
+            </a:solidFill>
+          </a:ln>
         </p:spPr>
         <p:style>
           <a:lnRef idx="2">
@@ -5909,6 +5814,11 @@
             <a:avLst/>
           </a:prstGeom>
           <a:noFill/>
+          <a:ln>
+            <a:solidFill>
+              <a:schemeClr val="tx1"/>
+            </a:solidFill>
+          </a:ln>
         </p:spPr>
         <p:style>
           <a:lnRef idx="2">
@@ -6133,6 +6043,11 @@
             <a:avLst/>
           </a:prstGeom>
           <a:noFill/>
+          <a:ln>
+            <a:solidFill>
+              <a:schemeClr val="tx1"/>
+            </a:solidFill>
+          </a:ln>
         </p:spPr>
         <p:style>
           <a:lnRef idx="2">
@@ -6357,6 +6272,11 @@
             <a:avLst/>
           </a:prstGeom>
           <a:noFill/>
+          <a:ln>
+            <a:solidFill>
+              <a:schemeClr val="tx1"/>
+            </a:solidFill>
+          </a:ln>
         </p:spPr>
         <p:style>
           <a:lnRef idx="2">
@@ -6634,6 +6554,11 @@
             <a:avLst/>
           </a:prstGeom>
           <a:noFill/>
+          <a:ln>
+            <a:solidFill>
+              <a:schemeClr val="tx1"/>
+            </a:solidFill>
+          </a:ln>
         </p:spPr>
         <p:style>
           <a:lnRef idx="2">
@@ -6858,6 +6783,11 @@
             <a:avLst/>
           </a:prstGeom>
           <a:noFill/>
+          <a:ln>
+            <a:solidFill>
+              <a:schemeClr val="tx1"/>
+            </a:solidFill>
+          </a:ln>
         </p:spPr>
         <p:style>
           <a:lnRef idx="2">
@@ -7082,6 +7012,11 @@
             <a:avLst/>
           </a:prstGeom>
           <a:noFill/>
+          <a:ln>
+            <a:solidFill>
+              <a:schemeClr val="tx1"/>
+            </a:solidFill>
+          </a:ln>
         </p:spPr>
         <p:style>
           <a:lnRef idx="2">
@@ -7359,6 +7294,11 @@
             <a:avLst/>
           </a:prstGeom>
           <a:noFill/>
+          <a:ln>
+            <a:solidFill>
+              <a:schemeClr val="tx1"/>
+            </a:solidFill>
+          </a:ln>
         </p:spPr>
         <p:style>
           <a:lnRef idx="2">
@@ -7583,6 +7523,11 @@
             <a:avLst/>
           </a:prstGeom>
           <a:noFill/>
+          <a:ln>
+            <a:solidFill>
+              <a:schemeClr val="tx1"/>
+            </a:solidFill>
+          </a:ln>
         </p:spPr>
         <p:style>
           <a:lnRef idx="2">
@@ -7807,6 +7752,11 @@
             <a:avLst/>
           </a:prstGeom>
           <a:noFill/>
+          <a:ln>
+            <a:solidFill>
+              <a:schemeClr val="tx1"/>
+            </a:solidFill>
+          </a:ln>
         </p:spPr>
         <p:style>
           <a:lnRef idx="2">
@@ -8084,6 +8034,11 @@
             <a:avLst/>
           </a:prstGeom>
           <a:noFill/>
+          <a:ln>
+            <a:solidFill>
+              <a:schemeClr val="tx1"/>
+            </a:solidFill>
+          </a:ln>
         </p:spPr>
         <p:style>
           <a:lnRef idx="2">
@@ -8307,6 +8262,11 @@
             <a:avLst/>
           </a:prstGeom>
           <a:noFill/>
+          <a:ln>
+            <a:solidFill>
+              <a:schemeClr val="tx1"/>
+            </a:solidFill>
+          </a:ln>
         </p:spPr>
         <p:style>
           <a:lnRef idx="2">

</xml_diff>